<commit_message>
React 2025 Training Resources
</commit_message>
<xml_diff>
--- a/2024/Presentation/Context API.pptx
+++ b/2024/Presentation/Context API.pptx
@@ -1048,7 +1048,7 @@
           <a:p>
             <a:fld id="{4B3F774C-70F7-4ED4-813C-739E51CF8487}" type="datetimeFigureOut">
               <a:rPr lang="en-US" smtClean="0"/>
-              <a:t>11/15/2024</a:t>
+              <a:t>11/25/2025</a:t>
             </a:fld>
             <a:endParaRPr lang="en-US" dirty="0"/>
           </a:p>
@@ -1391,6 +1391,13 @@
               <a:noFill/>
             </a:ln>
           </p:spPr>
+          <p:txBody>
+            <a:bodyPr/>
+            <a:lstStyle/>
+            <a:p>
+              <a:endParaRPr lang="en-IN"/>
+            </a:p>
+          </p:txBody>
         </p:sp>
         <p:sp>
           <p:nvSpPr>
@@ -1443,6 +1450,13 @@
               <a:noFill/>
             </a:ln>
           </p:spPr>
+          <p:txBody>
+            <a:bodyPr/>
+            <a:lstStyle/>
+            <a:p>
+              <a:endParaRPr lang="en-IN"/>
+            </a:p>
+          </p:txBody>
         </p:sp>
         <p:sp>
           <p:nvSpPr>
@@ -1489,6 +1503,13 @@
               <a:noFill/>
             </a:ln>
           </p:spPr>
+          <p:txBody>
+            <a:bodyPr/>
+            <a:lstStyle/>
+            <a:p>
+              <a:endParaRPr lang="en-IN"/>
+            </a:p>
+          </p:txBody>
         </p:sp>
         <p:sp>
           <p:nvSpPr>
@@ -1534,6 +1555,13 @@
               <a:noFill/>
             </a:ln>
           </p:spPr>
+          <p:txBody>
+            <a:bodyPr/>
+            <a:lstStyle/>
+            <a:p>
+              <a:endParaRPr lang="en-IN"/>
+            </a:p>
+          </p:txBody>
         </p:sp>
         <p:sp>
           <p:nvSpPr>
@@ -1585,6 +1613,13 @@
               <a:noFill/>
             </a:ln>
           </p:spPr>
+          <p:txBody>
+            <a:bodyPr/>
+            <a:lstStyle/>
+            <a:p>
+              <a:endParaRPr lang="en-IN"/>
+            </a:p>
+          </p:txBody>
         </p:sp>
         <p:sp>
           <p:nvSpPr>
@@ -1643,6 +1678,13 @@
               <a:noFill/>
             </a:ln>
           </p:spPr>
+          <p:txBody>
+            <a:bodyPr/>
+            <a:lstStyle/>
+            <a:p>
+              <a:endParaRPr lang="en-IN"/>
+            </a:p>
+          </p:txBody>
         </p:sp>
       </p:grpSp>
       <p:sp>
@@ -1817,7 +1859,7 @@
           <a:p>
             <a:fld id="{8E488443-9381-4175-872B-039B7D7F1909}" type="datetime4">
               <a:rPr lang="en-US" smtClean="0"/>
-              <a:t>November 15, 2024</a:t>
+              <a:t>November 25, 2025</a:t>
             </a:fld>
             <a:endParaRPr lang="en-US" dirty="0"/>
           </a:p>
@@ -2126,7 +2168,7 @@
           <a:p>
             <a:fld id="{13ED5676-B180-4927-B9A1-D182412B6735}" type="datetime4">
               <a:rPr lang="en-US" smtClean="0"/>
-              <a:t>November 15, 2024</a:t>
+              <a:t>November 25, 2025</a:t>
             </a:fld>
             <a:endParaRPr lang="en-US" dirty="0"/>
           </a:p>
@@ -2387,7 +2429,7 @@
           <a:p>
             <a:fld id="{573E09B9-0289-4444-84AE-D56F1C1C1FD1}" type="datetime4">
               <a:rPr lang="en-US" smtClean="0"/>
-              <a:t>November 15, 2024</a:t>
+              <a:t>November 25, 2025</a:t>
             </a:fld>
             <a:endParaRPr lang="en-US" dirty="0"/>
           </a:p>
@@ -2940,7 +2982,7 @@
           <a:p>
             <a:fld id="{4AE5ACBE-9878-4DA7-B0C3-3DFC480AFA6E}" type="datetime4">
               <a:rPr lang="en-US" smtClean="0"/>
-              <a:t>November 15, 2024</a:t>
+              <a:t>November 25, 2025</a:t>
             </a:fld>
             <a:endParaRPr lang="en-US" dirty="0"/>
           </a:p>
@@ -3201,7 +3243,7 @@
           <a:p>
             <a:fld id="{CF7F92E8-F4EE-41AB-8EDC-A7B53F3DEDCB}" type="datetime4">
               <a:rPr lang="en-US" smtClean="0"/>
-              <a:t>November 15, 2024</a:t>
+              <a:t>November 25, 2025</a:t>
             </a:fld>
             <a:endParaRPr lang="en-US" dirty="0"/>
           </a:p>
@@ -3746,7 +3788,7 @@
           <a:p>
             <a:fld id="{39E6DF79-2213-4003-87FF-DAAB1896EAEC}" type="datetime4">
               <a:rPr lang="en-US" smtClean="0"/>
-              <a:t>November 15, 2024</a:t>
+              <a:t>November 25, 2025</a:t>
             </a:fld>
             <a:endParaRPr lang="en-US" dirty="0"/>
           </a:p>
@@ -4056,7 +4098,7 @@
           <a:p>
             <a:fld id="{66D5B0A6-5A8D-4B52-8552-D28650188AD5}" type="datetime4">
               <a:rPr lang="en-US" smtClean="0"/>
-              <a:t>November 15, 2024</a:t>
+              <a:t>November 25, 2025</a:t>
             </a:fld>
             <a:endParaRPr lang="en-US" dirty="0"/>
           </a:p>
@@ -4243,7 +4285,7 @@
           <a:p>
             <a:fld id="{EAD5AB8B-016E-40BF-A1BC-ED5BC73A1DF7}" type="datetime4">
               <a:rPr lang="en-US" smtClean="0"/>
-              <a:t>November 15, 2024</a:t>
+              <a:t>November 25, 2025</a:t>
             </a:fld>
             <a:endParaRPr lang="en-US" dirty="0"/>
           </a:p>
@@ -4436,7 +4478,7 @@
           <a:p>
             <a:fld id="{D2B24580-AE43-4325-B87A-4EA1A4F6CC9F}" type="datetime4">
               <a:rPr lang="en-US" smtClean="0"/>
-              <a:t>November 15, 2024</a:t>
+              <a:t>November 25, 2025</a:t>
             </a:fld>
             <a:endParaRPr lang="en-US" dirty="0"/>
           </a:p>
@@ -4619,7 +4661,7 @@
           <a:p>
             <a:fld id="{AC74635B-DAC2-48C9-B293-D7838FD922A3}" type="datetime4">
               <a:rPr lang="en-US" smtClean="0"/>
-              <a:t>November 15, 2024</a:t>
+              <a:t>November 25, 2025</a:t>
             </a:fld>
             <a:endParaRPr lang="en-US" dirty="0"/>
           </a:p>
@@ -4883,7 +4925,7 @@
           <a:p>
             <a:fld id="{12E74DF3-ADA0-4FA0-9215-C414A5B1816C}" type="datetime4">
               <a:rPr lang="en-US" smtClean="0"/>
-              <a:t>November 15, 2024</a:t>
+              <a:t>November 25, 2025</a:t>
             </a:fld>
             <a:endParaRPr lang="en-US" dirty="0"/>
           </a:p>
@@ -5193,7 +5235,7 @@
           <a:p>
             <a:fld id="{30887AAA-3E5E-4FA2-B743-3863AE454536}" type="datetime4">
               <a:rPr lang="en-US" smtClean="0"/>
-              <a:t>November 15, 2024</a:t>
+              <a:t>November 25, 2025</a:t>
             </a:fld>
             <a:endParaRPr lang="en-US" dirty="0"/>
           </a:p>
@@ -5648,7 +5690,7 @@
           <a:p>
             <a:fld id="{D967BA7B-6841-4E5F-8D29-BF9F6F27376B}" type="datetime4">
               <a:rPr lang="en-US" smtClean="0"/>
-              <a:t>November 15, 2024</a:t>
+              <a:t>November 25, 2025</a:t>
             </a:fld>
             <a:endParaRPr lang="en-US" dirty="0"/>
           </a:p>
@@ -5779,7 +5821,7 @@
           <a:p>
             <a:fld id="{B486505F-52B4-4B4E-B6D7-B30F4E47F40A}" type="datetime4">
               <a:rPr lang="en-US" smtClean="0"/>
-              <a:t>November 15, 2024</a:t>
+              <a:t>November 25, 2025</a:t>
             </a:fld>
             <a:endParaRPr lang="en-US" dirty="0"/>
           </a:p>
@@ -5887,7 +5929,7 @@
           <a:p>
             <a:fld id="{D9730EB6-67A3-4F48-8A9B-C3AFBD7E6B8A}" type="datetime4">
               <a:rPr lang="en-US" smtClean="0"/>
-              <a:t>November 15, 2024</a:t>
+              <a:t>November 25, 2025</a:t>
             </a:fld>
             <a:endParaRPr lang="en-US" dirty="0"/>
           </a:p>
@@ -6183,7 +6225,7 @@
           <a:p>
             <a:fld id="{85B1A8E0-3139-4197-94AE-1A77A58DB9BF}" type="datetime4">
               <a:rPr lang="en-US" smtClean="0"/>
-              <a:t>November 15, 2024</a:t>
+              <a:t>November 25, 2025</a:t>
             </a:fld>
             <a:endParaRPr lang="en-US" dirty="0"/>
           </a:p>
@@ -6487,7 +6529,7 @@
           <a:p>
             <a:fld id="{FFD6D779-B675-49F8-9507-9E6D0F5BB66D}" type="datetime4">
               <a:rPr lang="en-US" smtClean="0"/>
-              <a:t>November 15, 2024</a:t>
+              <a:t>November 25, 2025</a:t>
             </a:fld>
             <a:endParaRPr lang="en-US" dirty="0"/>
           </a:p>
@@ -6642,6 +6684,13 @@
               <a:noFill/>
             </a:ln>
           </p:spPr>
+          <p:txBody>
+            <a:bodyPr/>
+            <a:lstStyle/>
+            <a:p>
+              <a:endParaRPr lang="en-IN"/>
+            </a:p>
+          </p:txBody>
         </p:sp>
         <p:sp>
           <p:nvSpPr>
@@ -6691,6 +6740,13 @@
               <a:noFill/>
             </a:ln>
           </p:spPr>
+          <p:txBody>
+            <a:bodyPr/>
+            <a:lstStyle/>
+            <a:p>
+              <a:endParaRPr lang="en-IN"/>
+            </a:p>
+          </p:txBody>
         </p:sp>
         <p:sp>
           <p:nvSpPr>
@@ -6737,6 +6793,13 @@
               <a:noFill/>
             </a:ln>
           </p:spPr>
+          <p:txBody>
+            <a:bodyPr/>
+            <a:lstStyle/>
+            <a:p>
+              <a:endParaRPr lang="en-IN"/>
+            </a:p>
+          </p:txBody>
         </p:sp>
         <p:sp>
           <p:nvSpPr>
@@ -6782,6 +6845,13 @@
               <a:noFill/>
             </a:ln>
           </p:spPr>
+          <p:txBody>
+            <a:bodyPr/>
+            <a:lstStyle/>
+            <a:p>
+              <a:endParaRPr lang="en-IN"/>
+            </a:p>
+          </p:txBody>
         </p:sp>
         <p:sp>
           <p:nvSpPr>
@@ -6833,6 +6903,13 @@
               <a:noFill/>
             </a:ln>
           </p:spPr>
+          <p:txBody>
+            <a:bodyPr/>
+            <a:lstStyle/>
+            <a:p>
+              <a:endParaRPr lang="en-IN"/>
+            </a:p>
+          </p:txBody>
         </p:sp>
         <p:sp>
           <p:nvSpPr>
@@ -6897,6 +6974,13 @@
               <a:noFill/>
             </a:ln>
           </p:spPr>
+          <p:txBody>
+            <a:bodyPr/>
+            <a:lstStyle/>
+            <a:p>
+              <a:endParaRPr lang="en-IN"/>
+            </a:p>
+          </p:txBody>
         </p:sp>
       </p:grpSp>
       <p:sp>
@@ -7030,7 +7114,7 @@
           <a:p>
             <a:fld id="{6C205C30-119B-47BD-9DCB-D8B23571C651}" type="datetime4">
               <a:rPr lang="en-US" smtClean="0"/>
-              <a:t>November 15, 2024</a:t>
+              <a:t>November 25, 2025</a:t>
             </a:fld>
             <a:endParaRPr lang="en-US" dirty="0"/>
           </a:p>
@@ -37553,7 +37637,7 @@
 </file>
 
 <file path=ppt/slides/slide7.xml><?xml version="1.0" encoding="utf-8"?>
-<p:sld xmlns:a="http://schemas.openxmlformats.org/drawingml/2006/main" xmlns:r="http://schemas.openxmlformats.org/officeDocument/2006/relationships" xmlns:p="http://schemas.openxmlformats.org/presentationml/2006/main">
+<p:sld xmlns:a="http://schemas.openxmlformats.org/drawingml/2006/main" xmlns:r="http://schemas.openxmlformats.org/officeDocument/2006/relationships" xmlns:p="http://schemas.openxmlformats.org/presentationml/2006/main" show="0">
   <p:cSld>
     <p:bg>
       <p:bgPr>
@@ -38967,13 +39051,13 @@
   <p:clrMapOvr>
     <a:overrideClrMapping bg1="dk1" tx1="lt1" bg2="dk2" tx2="lt2" accent1="accent1" accent2="accent2" accent3="accent3" accent4="accent4" accent5="accent5" accent6="accent6" hlink="hlink" folHlink="folHlink"/>
   </p:clrMapOvr>
-  <mc:AlternateContent xmlns:mc="http://schemas.openxmlformats.org/markup-compatibility/2006" xmlns:p159="http://schemas.microsoft.com/office/powerpoint/2015/09/main">
-    <mc:Choice Requires="p159">
+  <mc:AlternateContent xmlns:mc="http://schemas.openxmlformats.org/markup-compatibility/2006">
+    <mc:Choice xmlns:p159="http://schemas.microsoft.com/office/powerpoint/2015/09/main" Requires="p159">
       <p:transition>
         <p159:morph option="byObject"/>
       </p:transition>
     </mc:Choice>
-    <mc:Fallback xmlns="">
+    <mc:Fallback>
       <p:transition>
         <p:fade/>
       </p:transition>
@@ -43027,6 +43111,14 @@
 </file>
 
 <file path=customXml/item1.xml><?xml version="1.0" encoding="utf-8"?>
+<p:properties xmlns:p="http://schemas.microsoft.com/office/2006/metadata/properties" xmlns:xsi="http://www.w3.org/2001/XMLSchema-instance" xmlns:pc="http://schemas.microsoft.com/office/infopath/2007/PartnerControls">
+  <documentManagement>
+    <MediaServiceKeyPoints xmlns="71af3243-3dd4-4a8d-8c0d-dd76da1f02a5" xsi:nil="true"/>
+  </documentManagement>
+</p:properties>
+</file>
+
+<file path=customXml/item2.xml><?xml version="1.0" encoding="utf-8"?>
 <ct:contentTypeSchema xmlns:ct="http://schemas.microsoft.com/office/2006/metadata/contentType" xmlns:ma="http://schemas.microsoft.com/office/2006/metadata/properties/metaAttributes" ct:_="" ma:_="" ma:contentTypeName="Document" ma:contentTypeID="0x01010079F111ED35F8CC479449609E8A0923A6" ma:contentTypeVersion="11" ma:contentTypeDescription="Create a new document." ma:contentTypeScope="" ma:versionID="9677210f24a1be23c92c90fd886aa0aa">
   <xsd:schema xmlns:xsd="http://www.w3.org/2001/XMLSchema" xmlns:xs="http://www.w3.org/2001/XMLSchema" xmlns:p="http://schemas.microsoft.com/office/2006/metadata/properties" xmlns:ns2="71af3243-3dd4-4a8d-8c0d-dd76da1f02a5" xmlns:ns3="16c05727-aa75-4e4a-9b5f-8a80a1165891" targetNamespace="http://schemas.microsoft.com/office/2006/metadata/properties" ma:root="true" ma:fieldsID="60e05723c5c1908df1a1a4ebf11d344e" ns2:_="" ns3:_="">
     <xsd:import namespace="71af3243-3dd4-4a8d-8c0d-dd76da1f02a5"/>
@@ -43237,14 +43329,6 @@
 </ct:contentTypeSchema>
 </file>
 
-<file path=customXml/item2.xml><?xml version="1.0" encoding="utf-8"?>
-<p:properties xmlns:p="http://schemas.microsoft.com/office/2006/metadata/properties" xmlns:xsi="http://www.w3.org/2001/XMLSchema-instance" xmlns:pc="http://schemas.microsoft.com/office/infopath/2007/PartnerControls">
-  <documentManagement>
-    <MediaServiceKeyPoints xmlns="71af3243-3dd4-4a8d-8c0d-dd76da1f02a5" xsi:nil="true"/>
-  </documentManagement>
-</p:properties>
-</file>
-
 <file path=customXml/item3.xml><?xml version="1.0" encoding="utf-8"?>
 <?mso-contentType ?>
 <FormTemplates xmlns="http://schemas.microsoft.com/sharepoint/v3/contenttype/forms">
@@ -43255,6 +43339,16 @@
 </file>
 
 <file path=customXml/itemProps1.xml><?xml version="1.0" encoding="utf-8"?>
+<ds:datastoreItem xmlns:ds="http://schemas.openxmlformats.org/officeDocument/2006/customXml" ds:itemID="{D7023227-530E-4024-91EF-312A851A758C}">
+  <ds:schemaRefs>
+    <ds:schemaRef ds:uri="http://schemas.microsoft.com/office/2006/metadata/properties"/>
+    <ds:schemaRef ds:uri="http://schemas.microsoft.com/office/infopath/2007/PartnerControls"/>
+    <ds:schemaRef ds:uri="71af3243-3dd4-4a8d-8c0d-dd76da1f02a5"/>
+  </ds:schemaRefs>
+</ds:datastoreItem>
+</file>
+
+<file path=customXml/itemProps2.xml><?xml version="1.0" encoding="utf-8"?>
 <ds:datastoreItem xmlns:ds="http://schemas.openxmlformats.org/officeDocument/2006/customXml" ds:itemID="{627C19A7-3107-4CB2-BD0D-F7C79BE028CC}">
   <ds:schemaRefs>
     <ds:schemaRef ds:uri="http://schemas.microsoft.com/office/2006/metadata/contentType"/>
@@ -43273,16 +43367,6 @@
 </ds:datastoreItem>
 </file>
 
-<file path=customXml/itemProps2.xml><?xml version="1.0" encoding="utf-8"?>
-<ds:datastoreItem xmlns:ds="http://schemas.openxmlformats.org/officeDocument/2006/customXml" ds:itemID="{D7023227-530E-4024-91EF-312A851A758C}">
-  <ds:schemaRefs>
-    <ds:schemaRef ds:uri="http://schemas.microsoft.com/office/2006/metadata/properties"/>
-    <ds:schemaRef ds:uri="http://schemas.microsoft.com/office/infopath/2007/PartnerControls"/>
-    <ds:schemaRef ds:uri="71af3243-3dd4-4a8d-8c0d-dd76da1f02a5"/>
-  </ds:schemaRefs>
-</ds:datastoreItem>
-</file>
-
 <file path=customXml/itemProps3.xml><?xml version="1.0" encoding="utf-8"?>
 <ds:datastoreItem xmlns:ds="http://schemas.openxmlformats.org/officeDocument/2006/customXml" ds:itemID="{33315AA3-EAE3-44ED-8368-BAC2FFFB4817}">
   <ds:schemaRefs>

</xml_diff>